<commit_message>
Deploy website Thu Sep 22 12:53:46 PDT 2022
</commit_message>
<xml_diff>
--- a/assets/slides/fa22/08-Lambda_Dictionaries.pptx
+++ b/assets/slides/fa22/08-Lambda_Dictionaries.pptx
@@ -13298,7 +13298,12 @@
             <p:ph idx="1"/>
           </p:nvPr>
         </p:nvSpPr>
-        <p:spPr/>
+        <p:spPr>
+          <a:xfrm>
+            <a:off x="501868" y="1035268"/>
+            <a:ext cx="11125200" cy="5257800"/>
+          </a:xfrm>
+        </p:spPr>
         <p:txBody>
           <a:bodyPr/>
           <a:lstStyle/>
@@ -13346,13 +13351,8 @@
             <a:pPr lvl="1"/>
             <a:r>
               <a:rPr lang="en-US" dirty="0"/>
-              <a:t> Office Hours </a:t>
-            </a:r>
-            <a:r>
-              <a:rPr lang="en-US"/>
-              <a:t>may move</a:t>
-            </a:r>
-            <a:endParaRPr lang="en-US" dirty="0"/>
+              <a:t> Office Hours may move</a:t>
+            </a:r>
           </a:p>
         </p:txBody>
       </p:sp>

</xml_diff>

<commit_message>
Deploy website Tue Sep 27 12:48:34 PDT 2022
</commit_message>
<xml_diff>
--- a/assets/slides/fa22/08-Lambda_Dictionaries.pptx
+++ b/assets/slides/fa22/08-Lambda_Dictionaries.pptx
@@ -2170,7 +2170,7 @@
           </a:ln>
           <a:extLst>
             <a:ext uri="{909E8E84-426E-40dd-AFC4-6F175D3DCCD1}">
-              <a14:hiddenFill xmlns="" xmlns:a14="http://schemas.microsoft.com/office/drawing/2010/main">
+              <a14:hiddenFill xmlns:a14="http://schemas.microsoft.com/office/drawing/2010/main" xmlns="">
                 <a:noFill/>
               </a14:hiddenFill>
             </a:ext>
@@ -2211,14 +2211,14 @@
           </a:ln>
           <a:extLst>
             <a:ext uri="{909E8E84-426E-40dd-AFC4-6F175D3DCCD1}">
-              <a14:hiddenFill xmlns="" xmlns:a14="http://schemas.microsoft.com/office/drawing/2010/main">
+              <a14:hiddenFill xmlns:a14="http://schemas.microsoft.com/office/drawing/2010/main" xmlns="">
                 <a:solidFill>
                   <a:srgbClr val="FFFFFF"/>
                 </a:solidFill>
               </a14:hiddenFill>
             </a:ext>
             <a:ext uri="{91240B29-F687-4f45-9708-019B960494DF}">
-              <a14:hiddenLine xmlns="" xmlns:a14="http://schemas.microsoft.com/office/drawing/2010/main" w="9525">
+              <a14:hiddenLine xmlns:a14="http://schemas.microsoft.com/office/drawing/2010/main" xmlns="" w="9525">
                 <a:solidFill>
                   <a:srgbClr val="000000"/>
                 </a:solidFill>
@@ -2322,14 +2322,14 @@
           </a:ln>
           <a:extLst>
             <a:ext uri="{909E8E84-426E-40dd-AFC4-6F175D3DCCD1}">
-              <a14:hiddenFill xmlns="" xmlns:a14="http://schemas.microsoft.com/office/drawing/2010/main">
+              <a14:hiddenFill xmlns:a14="http://schemas.microsoft.com/office/drawing/2010/main" xmlns="">
                 <a:solidFill>
                   <a:srgbClr val="FFFFFF"/>
                 </a:solidFill>
               </a14:hiddenFill>
             </a:ext>
             <a:ext uri="{91240B29-F687-4f45-9708-019B960494DF}">
-              <a14:hiddenLine xmlns="" xmlns:a14="http://schemas.microsoft.com/office/drawing/2010/main" w="9525">
+              <a14:hiddenLine xmlns:a14="http://schemas.microsoft.com/office/drawing/2010/main" xmlns="" w="9525">
                 <a:solidFill>
                   <a:srgbClr val="000000"/>
                 </a:solidFill>
@@ -2339,7 +2339,7 @@
               </a14:hiddenLine>
             </a:ext>
             <a:ext uri="{FAA26D3D-D897-4be2-8F04-BA451C77F1D7}">
-              <ma14:placeholderFlag xmlns="" xmlns:ma14="http://schemas.microsoft.com/office/mac/drawingml/2011/main" val="1"/>
+              <ma14:placeholderFlag xmlns:ma14="http://schemas.microsoft.com/office/mac/drawingml/2011/main" xmlns="" val="1"/>
             </a:ext>
           </a:extLst>
         </p:spPr>
@@ -2677,14 +2677,14 @@
           </a:ln>
           <a:extLst>
             <a:ext uri="{909E8E84-426E-40dd-AFC4-6F175D3DCCD1}">
-              <a14:hiddenFill xmlns="" xmlns:a14="http://schemas.microsoft.com/office/drawing/2010/main">
+              <a14:hiddenFill xmlns:a14="http://schemas.microsoft.com/office/drawing/2010/main" xmlns="">
                 <a:solidFill>
                   <a:srgbClr val="FFFFFF"/>
                 </a:solidFill>
               </a14:hiddenFill>
             </a:ext>
             <a:ext uri="{91240B29-F687-4f45-9708-019B960494DF}">
-              <a14:hiddenLine xmlns="" xmlns:a14="http://schemas.microsoft.com/office/drawing/2010/main" w="9525">
+              <a14:hiddenLine xmlns:a14="http://schemas.microsoft.com/office/drawing/2010/main" xmlns="" w="9525">
                 <a:solidFill>
                   <a:srgbClr val="000000"/>
                 </a:solidFill>
@@ -2694,7 +2694,7 @@
               </a14:hiddenLine>
             </a:ext>
             <a:ext uri="{FAA26D3D-D897-4be2-8F04-BA451C77F1D7}">
-              <ma14:placeholderFlag xmlns="" xmlns:ma14="http://schemas.microsoft.com/office/mac/drawingml/2011/main" val="1"/>
+              <ma14:placeholderFlag xmlns:ma14="http://schemas.microsoft.com/office/mac/drawingml/2011/main" xmlns="" val="1"/>
             </a:ext>
           </a:extLst>
         </p:spPr>
@@ -5249,14 +5249,14 @@
           </a:ln>
           <a:extLst>
             <a:ext uri="{909E8E84-426E-40dd-AFC4-6F175D3DCCD1}">
-              <a14:hiddenFill xmlns="" xmlns:a14="http://schemas.microsoft.com/office/drawing/2010/main">
+              <a14:hiddenFill xmlns:a14="http://schemas.microsoft.com/office/drawing/2010/main" xmlns="">
                 <a:solidFill>
                   <a:srgbClr val="FFFFFF"/>
                 </a:solidFill>
               </a14:hiddenFill>
             </a:ext>
             <a:ext uri="{91240B29-F687-4f45-9708-019B960494DF}">
-              <a14:hiddenLine xmlns="" xmlns:a14="http://schemas.microsoft.com/office/drawing/2010/main" w="9525">
+              <a14:hiddenLine xmlns:a14="http://schemas.microsoft.com/office/drawing/2010/main" xmlns="" w="9525">
                 <a:solidFill>
                   <a:srgbClr val="000000"/>
                 </a:solidFill>
@@ -5266,7 +5266,7 @@
               </a14:hiddenLine>
             </a:ext>
             <a:ext uri="{FAA26D3D-D897-4be2-8F04-BA451C77F1D7}">
-              <ma14:placeholderFlag xmlns="" xmlns:ma14="http://schemas.microsoft.com/office/mac/drawingml/2011/main" val="1"/>
+              <ma14:placeholderFlag xmlns:ma14="http://schemas.microsoft.com/office/mac/drawingml/2011/main" xmlns="" val="1"/>
             </a:ext>
           </a:extLst>
         </p:spPr>
@@ -5310,14 +5310,14 @@
           </a:ln>
           <a:extLst>
             <a:ext uri="{909E8E84-426E-40dd-AFC4-6F175D3DCCD1}">
-              <a14:hiddenFill xmlns="" xmlns:a14="http://schemas.microsoft.com/office/drawing/2010/main">
+              <a14:hiddenFill xmlns:a14="http://schemas.microsoft.com/office/drawing/2010/main" xmlns="">
                 <a:solidFill>
                   <a:srgbClr val="FFFFFF"/>
                 </a:solidFill>
               </a14:hiddenFill>
             </a:ext>
             <a:ext uri="{91240B29-F687-4f45-9708-019B960494DF}">
-              <a14:hiddenLine xmlns="" xmlns:a14="http://schemas.microsoft.com/office/drawing/2010/main" w="9525">
+              <a14:hiddenLine xmlns:a14="http://schemas.microsoft.com/office/drawing/2010/main" xmlns="" w="9525">
                 <a:solidFill>
                   <a:srgbClr val="000000"/>
                 </a:solidFill>
@@ -5327,7 +5327,7 @@
               </a14:hiddenLine>
             </a:ext>
             <a:ext uri="{FAA26D3D-D897-4be2-8F04-BA451C77F1D7}">
-              <ma14:placeholderFlag xmlns="" xmlns:ma14="http://schemas.microsoft.com/office/mac/drawingml/2011/main" val="1"/>
+              <ma14:placeholderFlag xmlns:ma14="http://schemas.microsoft.com/office/mac/drawingml/2011/main" xmlns="" val="1"/>
             </a:ext>
           </a:extLst>
         </p:spPr>
@@ -5432,7 +5432,7 @@
           </a:ln>
           <a:extLst>
             <a:ext uri="{909E8E84-426E-40dd-AFC4-6F175D3DCCD1}">
-              <a14:hiddenFill xmlns="" xmlns:a14="http://schemas.microsoft.com/office/drawing/2010/main">
+              <a14:hiddenFill xmlns:a14="http://schemas.microsoft.com/office/drawing/2010/main" xmlns="">
                 <a:noFill/>
               </a14:hiddenFill>
             </a:ext>
@@ -5473,14 +5473,14 @@
           </a:ln>
           <a:extLst>
             <a:ext uri="{909E8E84-426E-40dd-AFC4-6F175D3DCCD1}">
-              <a14:hiddenFill xmlns="" xmlns:a14="http://schemas.microsoft.com/office/drawing/2010/main">
+              <a14:hiddenFill xmlns:a14="http://schemas.microsoft.com/office/drawing/2010/main" xmlns="">
                 <a:solidFill>
                   <a:srgbClr val="FFFFFF"/>
                 </a:solidFill>
               </a14:hiddenFill>
             </a:ext>
             <a:ext uri="{91240B29-F687-4f45-9708-019B960494DF}">
-              <a14:hiddenLine xmlns="" xmlns:a14="http://schemas.microsoft.com/office/drawing/2010/main" w="9525">
+              <a14:hiddenLine xmlns:a14="http://schemas.microsoft.com/office/drawing/2010/main" xmlns="" w="9525">
                 <a:solidFill>
                   <a:srgbClr val="000000"/>
                 </a:solidFill>
@@ -5520,14 +5520,14 @@
           </a:ln>
           <a:extLst>
             <a:ext uri="{909E8E84-426E-40dd-AFC4-6F175D3DCCD1}">
-              <a14:hiddenFill xmlns="" xmlns:a14="http://schemas.microsoft.com/office/drawing/2010/main">
+              <a14:hiddenFill xmlns:a14="http://schemas.microsoft.com/office/drawing/2010/main" xmlns="">
                 <a:solidFill>
                   <a:srgbClr val="FFFFFF"/>
                 </a:solidFill>
               </a14:hiddenFill>
             </a:ext>
             <a:ext uri="{91240B29-F687-4f45-9708-019B960494DF}">
-              <a14:hiddenLine xmlns="" xmlns:a14="http://schemas.microsoft.com/office/drawing/2010/main" w="9525">
+              <a14:hiddenLine xmlns:a14="http://schemas.microsoft.com/office/drawing/2010/main" xmlns="" w="9525">
                 <a:solidFill>
                   <a:srgbClr val="000000"/>
                 </a:solidFill>
@@ -5537,7 +5537,7 @@
               </a14:hiddenLine>
             </a:ext>
             <a:ext uri="{FAA26D3D-D897-4be2-8F04-BA451C77F1D7}">
-              <ma14:placeholderFlag xmlns="" xmlns:ma14="http://schemas.microsoft.com/office/mac/drawingml/2011/main" val="1"/>
+              <ma14:placeholderFlag xmlns:ma14="http://schemas.microsoft.com/office/mac/drawingml/2011/main" xmlns="" val="1"/>
             </a:ext>
           </a:extLst>
         </p:spPr>
@@ -10122,61 +10122,6 @@
           </a:p>
         </p:txBody>
       </p:sp>
-      <p:sp>
-        <p:nvSpPr>
-          <p:cNvPr id="321" name="Google Shape;321;p31"/>
-          <p:cNvSpPr txBox="1">
-            <a:spLocks noGrp="1"/>
-          </p:cNvSpPr>
-          <p:nvPr>
-            <p:ph type="sldNum" idx="12"/>
-          </p:nvPr>
-        </p:nvSpPr>
-        <p:spPr>
-          <a:xfrm>
-            <a:off x="10134600" y="6553200"/>
-            <a:ext cx="533400" cy="304800"/>
-          </a:xfrm>
-          <a:prstGeom prst="rect">
-            <a:avLst/>
-          </a:prstGeom>
-          <a:noFill/>
-          <a:ln>
-            <a:noFill/>
-          </a:ln>
-        </p:spPr>
-        <p:txBody>
-          <a:bodyPr spcFirstLastPara="1" wrap="square" lIns="92075" tIns="46025" rIns="92075" bIns="46025" anchor="ctr" anchorCtr="0">
-            <a:noAutofit/>
-          </a:bodyPr>
-          <a:lstStyle/>
-          <a:p>
-            <a:pPr algn="r"/>
-            <a:fld id="{00000000-1234-1234-1234-123412341234}" type="slidenum">
-              <a:rPr lang="en-US" sz="1400" b="1">
-                <a:solidFill>
-                  <a:srgbClr val="FF9900"/>
-                </a:solidFill>
-                <a:latin typeface="Times New Roman"/>
-                <a:ea typeface="Times New Roman"/>
-                <a:cs typeface="Times New Roman"/>
-                <a:sym typeface="Times New Roman"/>
-              </a:rPr>
-              <a:pPr algn="r"/>
-              <a:t>22</a:t>
-            </a:fld>
-            <a:endParaRPr sz="1400">
-              <a:solidFill>
-                <a:srgbClr val="FF9900"/>
-              </a:solidFill>
-              <a:latin typeface="Times New Roman"/>
-              <a:ea typeface="Times New Roman"/>
-              <a:cs typeface="Times New Roman"/>
-              <a:sym typeface="Times New Roman"/>
-            </a:endParaRPr>
-          </a:p>
-        </p:txBody>
-      </p:sp>
       <p:pic>
         <p:nvPicPr>
           <p:cNvPr id="322" name="Google Shape;322;p31" descr="Screen Shot 2016-03-06 at 8.30.16 PM.png"/>
@@ -10284,620 +10229,6 @@
               <a:t>Dictionary Example</a:t>
             </a:r>
             <a:endParaRPr/>
-          </a:p>
-        </p:txBody>
-      </p:sp>
-      <p:sp>
-        <p:nvSpPr>
-          <p:cNvPr id="319" name="Google Shape;319;p31"/>
-          <p:cNvSpPr txBox="1">
-            <a:spLocks noGrp="1"/>
-          </p:cNvSpPr>
-          <p:nvPr>
-            <p:ph type="dt" idx="10"/>
-          </p:nvPr>
-        </p:nvSpPr>
-        <p:spPr>
-          <a:xfrm>
-            <a:off x="0" y="6553200"/>
-            <a:ext cx="1524000" cy="304800"/>
-          </a:xfrm>
-          <a:prstGeom prst="rect">
-            <a:avLst/>
-          </a:prstGeom>
-          <a:noFill/>
-          <a:ln>
-            <a:noFill/>
-          </a:ln>
-        </p:spPr>
-        <p:txBody>
-          <a:bodyPr spcFirstLastPara="1" wrap="square" lIns="92075" tIns="46025" rIns="92075" bIns="46025" anchor="ctr" anchorCtr="0">
-            <a:noAutofit/>
-          </a:bodyPr>
-          <a:lstStyle>
-            <a:defPPr marR="0" lvl="0" algn="l" rtl="0">
-              <a:lnSpc>
-                <a:spcPct val="100000"/>
-              </a:lnSpc>
-              <a:spcBef>
-                <a:spcPts val="0"/>
-              </a:spcBef>
-              <a:spcAft>
-                <a:spcPts val="0"/>
-              </a:spcAft>
-            </a:defPPr>
-            <a:lvl1pPr marR="0" lvl="0" algn="l" rtl="0">
-              <a:lnSpc>
-                <a:spcPct val="100000"/>
-              </a:lnSpc>
-              <a:spcBef>
-                <a:spcPts val="0"/>
-              </a:spcBef>
-              <a:spcAft>
-                <a:spcPts val="0"/>
-              </a:spcAft>
-              <a:buClr>
-                <a:srgbClr val="000000"/>
-              </a:buClr>
-              <a:buSzPts val="1400"/>
-              <a:buFont typeface="Arial"/>
-              <a:buNone/>
-              <a:defRPr sz="1200" b="1" i="0" u="none" strike="noStrike" cap="none">
-                <a:solidFill>
-                  <a:srgbClr val="FF9900"/>
-                </a:solidFill>
-                <a:latin typeface="Times New Roman"/>
-                <a:ea typeface="Times New Roman"/>
-                <a:cs typeface="Times New Roman"/>
-                <a:sym typeface="Times New Roman"/>
-              </a:defRPr>
-            </a:lvl1pPr>
-            <a:lvl2pPr marR="0" lvl="1" algn="l" rtl="0">
-              <a:lnSpc>
-                <a:spcPct val="100000"/>
-              </a:lnSpc>
-              <a:spcBef>
-                <a:spcPts val="0"/>
-              </a:spcBef>
-              <a:spcAft>
-                <a:spcPts val="0"/>
-              </a:spcAft>
-              <a:buClr>
-                <a:srgbClr val="000000"/>
-              </a:buClr>
-              <a:buSzPts val="1400"/>
-              <a:buFont typeface="Arial"/>
-              <a:buNone/>
-              <a:defRPr sz="1800" b="0" i="0" u="none" strike="noStrike" cap="none">
-                <a:solidFill>
-                  <a:schemeClr val="dk1"/>
-                </a:solidFill>
-                <a:latin typeface="Arial"/>
-                <a:ea typeface="Arial"/>
-                <a:cs typeface="Arial"/>
-                <a:sym typeface="Arial"/>
-              </a:defRPr>
-            </a:lvl2pPr>
-            <a:lvl3pPr marR="0" lvl="2" algn="l" rtl="0">
-              <a:lnSpc>
-                <a:spcPct val="100000"/>
-              </a:lnSpc>
-              <a:spcBef>
-                <a:spcPts val="0"/>
-              </a:spcBef>
-              <a:spcAft>
-                <a:spcPts val="0"/>
-              </a:spcAft>
-              <a:buClr>
-                <a:srgbClr val="000000"/>
-              </a:buClr>
-              <a:buSzPts val="1400"/>
-              <a:buFont typeface="Arial"/>
-              <a:buNone/>
-              <a:defRPr sz="1800" b="0" i="0" u="none" strike="noStrike" cap="none">
-                <a:solidFill>
-                  <a:schemeClr val="dk1"/>
-                </a:solidFill>
-                <a:latin typeface="Arial"/>
-                <a:ea typeface="Arial"/>
-                <a:cs typeface="Arial"/>
-                <a:sym typeface="Arial"/>
-              </a:defRPr>
-            </a:lvl3pPr>
-            <a:lvl4pPr marR="0" lvl="3" algn="l" rtl="0">
-              <a:lnSpc>
-                <a:spcPct val="100000"/>
-              </a:lnSpc>
-              <a:spcBef>
-                <a:spcPts val="0"/>
-              </a:spcBef>
-              <a:spcAft>
-                <a:spcPts val="0"/>
-              </a:spcAft>
-              <a:buClr>
-                <a:srgbClr val="000000"/>
-              </a:buClr>
-              <a:buSzPts val="1400"/>
-              <a:buFont typeface="Arial"/>
-              <a:buNone/>
-              <a:defRPr sz="1800" b="0" i="0" u="none" strike="noStrike" cap="none">
-                <a:solidFill>
-                  <a:schemeClr val="dk1"/>
-                </a:solidFill>
-                <a:latin typeface="Arial"/>
-                <a:ea typeface="Arial"/>
-                <a:cs typeface="Arial"/>
-                <a:sym typeface="Arial"/>
-              </a:defRPr>
-            </a:lvl4pPr>
-            <a:lvl5pPr marR="0" lvl="4" algn="l" rtl="0">
-              <a:lnSpc>
-                <a:spcPct val="100000"/>
-              </a:lnSpc>
-              <a:spcBef>
-                <a:spcPts val="0"/>
-              </a:spcBef>
-              <a:spcAft>
-                <a:spcPts val="0"/>
-              </a:spcAft>
-              <a:buClr>
-                <a:srgbClr val="000000"/>
-              </a:buClr>
-              <a:buSzPts val="1400"/>
-              <a:buFont typeface="Arial"/>
-              <a:buNone/>
-              <a:defRPr sz="1800" b="0" i="0" u="none" strike="noStrike" cap="none">
-                <a:solidFill>
-                  <a:schemeClr val="dk1"/>
-                </a:solidFill>
-                <a:latin typeface="Arial"/>
-                <a:ea typeface="Arial"/>
-                <a:cs typeface="Arial"/>
-                <a:sym typeface="Arial"/>
-              </a:defRPr>
-            </a:lvl5pPr>
-            <a:lvl6pPr marR="0" lvl="5" algn="l" rtl="0">
-              <a:lnSpc>
-                <a:spcPct val="100000"/>
-              </a:lnSpc>
-              <a:spcBef>
-                <a:spcPts val="0"/>
-              </a:spcBef>
-              <a:spcAft>
-                <a:spcPts val="0"/>
-              </a:spcAft>
-              <a:buClr>
-                <a:srgbClr val="000000"/>
-              </a:buClr>
-              <a:buSzPts val="1400"/>
-              <a:buFont typeface="Arial"/>
-              <a:buNone/>
-              <a:defRPr sz="1800" b="0" i="0" u="none" strike="noStrike" cap="none">
-                <a:solidFill>
-                  <a:schemeClr val="dk1"/>
-                </a:solidFill>
-                <a:latin typeface="Arial"/>
-                <a:ea typeface="Arial"/>
-                <a:cs typeface="Arial"/>
-                <a:sym typeface="Arial"/>
-              </a:defRPr>
-            </a:lvl6pPr>
-            <a:lvl7pPr marR="0" lvl="6" algn="l" rtl="0">
-              <a:lnSpc>
-                <a:spcPct val="100000"/>
-              </a:lnSpc>
-              <a:spcBef>
-                <a:spcPts val="0"/>
-              </a:spcBef>
-              <a:spcAft>
-                <a:spcPts val="0"/>
-              </a:spcAft>
-              <a:buClr>
-                <a:srgbClr val="000000"/>
-              </a:buClr>
-              <a:buSzPts val="1400"/>
-              <a:buFont typeface="Arial"/>
-              <a:buNone/>
-              <a:defRPr sz="1800" b="0" i="0" u="none" strike="noStrike" cap="none">
-                <a:solidFill>
-                  <a:schemeClr val="dk1"/>
-                </a:solidFill>
-                <a:latin typeface="Arial"/>
-                <a:ea typeface="Arial"/>
-                <a:cs typeface="Arial"/>
-                <a:sym typeface="Arial"/>
-              </a:defRPr>
-            </a:lvl7pPr>
-            <a:lvl8pPr marR="0" lvl="7" algn="l" rtl="0">
-              <a:lnSpc>
-                <a:spcPct val="100000"/>
-              </a:lnSpc>
-              <a:spcBef>
-                <a:spcPts val="0"/>
-              </a:spcBef>
-              <a:spcAft>
-                <a:spcPts val="0"/>
-              </a:spcAft>
-              <a:buClr>
-                <a:srgbClr val="000000"/>
-              </a:buClr>
-              <a:buSzPts val="1400"/>
-              <a:buFont typeface="Arial"/>
-              <a:buNone/>
-              <a:defRPr sz="1800" b="0" i="0" u="none" strike="noStrike" cap="none">
-                <a:solidFill>
-                  <a:schemeClr val="dk1"/>
-                </a:solidFill>
-                <a:latin typeface="Arial"/>
-                <a:ea typeface="Arial"/>
-                <a:cs typeface="Arial"/>
-                <a:sym typeface="Arial"/>
-              </a:defRPr>
-            </a:lvl8pPr>
-            <a:lvl9pPr marR="0" lvl="8" algn="l" rtl="0">
-              <a:lnSpc>
-                <a:spcPct val="100000"/>
-              </a:lnSpc>
-              <a:spcBef>
-                <a:spcPts val="0"/>
-              </a:spcBef>
-              <a:spcAft>
-                <a:spcPts val="0"/>
-              </a:spcAft>
-              <a:buClr>
-                <a:srgbClr val="000000"/>
-              </a:buClr>
-              <a:buSzPts val="1400"/>
-              <a:buFont typeface="Arial"/>
-              <a:buNone/>
-              <a:defRPr sz="1800" b="0" i="0" u="none" strike="noStrike" cap="none">
-                <a:solidFill>
-                  <a:schemeClr val="dk1"/>
-                </a:solidFill>
-                <a:latin typeface="Arial"/>
-                <a:ea typeface="Arial"/>
-                <a:cs typeface="Arial"/>
-                <a:sym typeface="Arial"/>
-              </a:defRPr>
-            </a:lvl9pPr>
-          </a:lstStyle>
-          <a:p>
-            <a:endParaRPr/>
-          </a:p>
-        </p:txBody>
-      </p:sp>
-      <p:sp>
-        <p:nvSpPr>
-          <p:cNvPr id="320" name="Google Shape;320;p31"/>
-          <p:cNvSpPr txBox="1">
-            <a:spLocks noGrp="1"/>
-          </p:cNvSpPr>
-          <p:nvPr>
-            <p:ph type="ftr" idx="11"/>
-          </p:nvPr>
-        </p:nvSpPr>
-        <p:spPr>
-          <a:xfrm>
-            <a:off x="3048000" y="6553200"/>
-            <a:ext cx="2895600" cy="304800"/>
-          </a:xfrm>
-          <a:prstGeom prst="rect">
-            <a:avLst/>
-          </a:prstGeom>
-          <a:noFill/>
-          <a:ln>
-            <a:noFill/>
-          </a:ln>
-        </p:spPr>
-        <p:txBody>
-          <a:bodyPr spcFirstLastPara="1" wrap="square" lIns="92075" tIns="46025" rIns="92075" bIns="46025" anchor="ctr" anchorCtr="0">
-            <a:noAutofit/>
-          </a:bodyPr>
-          <a:lstStyle>
-            <a:defPPr marR="0" lvl="0" algn="l" rtl="0">
-              <a:lnSpc>
-                <a:spcPct val="100000"/>
-              </a:lnSpc>
-              <a:spcBef>
-                <a:spcPts val="0"/>
-              </a:spcBef>
-              <a:spcAft>
-                <a:spcPts val="0"/>
-              </a:spcAft>
-            </a:defPPr>
-            <a:lvl1pPr marR="0" lvl="0" algn="ctr" rtl="0">
-              <a:lnSpc>
-                <a:spcPct val="100000"/>
-              </a:lnSpc>
-              <a:spcBef>
-                <a:spcPts val="0"/>
-              </a:spcBef>
-              <a:spcAft>
-                <a:spcPts val="0"/>
-              </a:spcAft>
-              <a:buClr>
-                <a:srgbClr val="000000"/>
-              </a:buClr>
-              <a:buSzPts val="1400"/>
-              <a:buFont typeface="Arial"/>
-              <a:buNone/>
-              <a:defRPr sz="1200" b="1" i="0" u="none" strike="noStrike" cap="none">
-                <a:solidFill>
-                  <a:srgbClr val="114FFB"/>
-                </a:solidFill>
-                <a:latin typeface="Helvetica Neue"/>
-                <a:ea typeface="Helvetica Neue"/>
-                <a:cs typeface="Helvetica Neue"/>
-                <a:sym typeface="Helvetica Neue"/>
-              </a:defRPr>
-            </a:lvl1pPr>
-            <a:lvl2pPr marR="0" lvl="1" algn="l" rtl="0">
-              <a:lnSpc>
-                <a:spcPct val="100000"/>
-              </a:lnSpc>
-              <a:spcBef>
-                <a:spcPts val="0"/>
-              </a:spcBef>
-              <a:spcAft>
-                <a:spcPts val="0"/>
-              </a:spcAft>
-              <a:buClr>
-                <a:srgbClr val="000000"/>
-              </a:buClr>
-              <a:buSzPts val="1400"/>
-              <a:buFont typeface="Arial"/>
-              <a:buNone/>
-              <a:defRPr sz="1800" b="0" i="0" u="none" strike="noStrike" cap="none">
-                <a:solidFill>
-                  <a:schemeClr val="dk1"/>
-                </a:solidFill>
-                <a:latin typeface="Arial"/>
-                <a:ea typeface="Arial"/>
-                <a:cs typeface="Arial"/>
-                <a:sym typeface="Arial"/>
-              </a:defRPr>
-            </a:lvl2pPr>
-            <a:lvl3pPr marR="0" lvl="2" algn="l" rtl="0">
-              <a:lnSpc>
-                <a:spcPct val="100000"/>
-              </a:lnSpc>
-              <a:spcBef>
-                <a:spcPts val="0"/>
-              </a:spcBef>
-              <a:spcAft>
-                <a:spcPts val="0"/>
-              </a:spcAft>
-              <a:buClr>
-                <a:srgbClr val="000000"/>
-              </a:buClr>
-              <a:buSzPts val="1400"/>
-              <a:buFont typeface="Arial"/>
-              <a:buNone/>
-              <a:defRPr sz="1800" b="0" i="0" u="none" strike="noStrike" cap="none">
-                <a:solidFill>
-                  <a:schemeClr val="dk1"/>
-                </a:solidFill>
-                <a:latin typeface="Arial"/>
-                <a:ea typeface="Arial"/>
-                <a:cs typeface="Arial"/>
-                <a:sym typeface="Arial"/>
-              </a:defRPr>
-            </a:lvl3pPr>
-            <a:lvl4pPr marR="0" lvl="3" algn="l" rtl="0">
-              <a:lnSpc>
-                <a:spcPct val="100000"/>
-              </a:lnSpc>
-              <a:spcBef>
-                <a:spcPts val="0"/>
-              </a:spcBef>
-              <a:spcAft>
-                <a:spcPts val="0"/>
-              </a:spcAft>
-              <a:buClr>
-                <a:srgbClr val="000000"/>
-              </a:buClr>
-              <a:buSzPts val="1400"/>
-              <a:buFont typeface="Arial"/>
-              <a:buNone/>
-              <a:defRPr sz="1800" b="0" i="0" u="none" strike="noStrike" cap="none">
-                <a:solidFill>
-                  <a:schemeClr val="dk1"/>
-                </a:solidFill>
-                <a:latin typeface="Arial"/>
-                <a:ea typeface="Arial"/>
-                <a:cs typeface="Arial"/>
-                <a:sym typeface="Arial"/>
-              </a:defRPr>
-            </a:lvl4pPr>
-            <a:lvl5pPr marR="0" lvl="4" algn="l" rtl="0">
-              <a:lnSpc>
-                <a:spcPct val="100000"/>
-              </a:lnSpc>
-              <a:spcBef>
-                <a:spcPts val="0"/>
-              </a:spcBef>
-              <a:spcAft>
-                <a:spcPts val="0"/>
-              </a:spcAft>
-              <a:buClr>
-                <a:srgbClr val="000000"/>
-              </a:buClr>
-              <a:buSzPts val="1400"/>
-              <a:buFont typeface="Arial"/>
-              <a:buNone/>
-              <a:defRPr sz="1800" b="0" i="0" u="none" strike="noStrike" cap="none">
-                <a:solidFill>
-                  <a:schemeClr val="dk1"/>
-                </a:solidFill>
-                <a:latin typeface="Arial"/>
-                <a:ea typeface="Arial"/>
-                <a:cs typeface="Arial"/>
-                <a:sym typeface="Arial"/>
-              </a:defRPr>
-            </a:lvl5pPr>
-            <a:lvl6pPr marR="0" lvl="5" algn="l" rtl="0">
-              <a:lnSpc>
-                <a:spcPct val="100000"/>
-              </a:lnSpc>
-              <a:spcBef>
-                <a:spcPts val="0"/>
-              </a:spcBef>
-              <a:spcAft>
-                <a:spcPts val="0"/>
-              </a:spcAft>
-              <a:buClr>
-                <a:srgbClr val="000000"/>
-              </a:buClr>
-              <a:buSzPts val="1400"/>
-              <a:buFont typeface="Arial"/>
-              <a:buNone/>
-              <a:defRPr sz="1800" b="0" i="0" u="none" strike="noStrike" cap="none">
-                <a:solidFill>
-                  <a:schemeClr val="dk1"/>
-                </a:solidFill>
-                <a:latin typeface="Arial"/>
-                <a:ea typeface="Arial"/>
-                <a:cs typeface="Arial"/>
-                <a:sym typeface="Arial"/>
-              </a:defRPr>
-            </a:lvl6pPr>
-            <a:lvl7pPr marR="0" lvl="6" algn="l" rtl="0">
-              <a:lnSpc>
-                <a:spcPct val="100000"/>
-              </a:lnSpc>
-              <a:spcBef>
-                <a:spcPts val="0"/>
-              </a:spcBef>
-              <a:spcAft>
-                <a:spcPts val="0"/>
-              </a:spcAft>
-              <a:buClr>
-                <a:srgbClr val="000000"/>
-              </a:buClr>
-              <a:buSzPts val="1400"/>
-              <a:buFont typeface="Arial"/>
-              <a:buNone/>
-              <a:defRPr sz="1800" b="0" i="0" u="none" strike="noStrike" cap="none">
-                <a:solidFill>
-                  <a:schemeClr val="dk1"/>
-                </a:solidFill>
-                <a:latin typeface="Arial"/>
-                <a:ea typeface="Arial"/>
-                <a:cs typeface="Arial"/>
-                <a:sym typeface="Arial"/>
-              </a:defRPr>
-            </a:lvl7pPr>
-            <a:lvl8pPr marR="0" lvl="7" algn="l" rtl="0">
-              <a:lnSpc>
-                <a:spcPct val="100000"/>
-              </a:lnSpc>
-              <a:spcBef>
-                <a:spcPts val="0"/>
-              </a:spcBef>
-              <a:spcAft>
-                <a:spcPts val="0"/>
-              </a:spcAft>
-              <a:buClr>
-                <a:srgbClr val="000000"/>
-              </a:buClr>
-              <a:buSzPts val="1400"/>
-              <a:buFont typeface="Arial"/>
-              <a:buNone/>
-              <a:defRPr sz="1800" b="0" i="0" u="none" strike="noStrike" cap="none">
-                <a:solidFill>
-                  <a:schemeClr val="dk1"/>
-                </a:solidFill>
-                <a:latin typeface="Arial"/>
-                <a:ea typeface="Arial"/>
-                <a:cs typeface="Arial"/>
-                <a:sym typeface="Arial"/>
-              </a:defRPr>
-            </a:lvl8pPr>
-            <a:lvl9pPr marR="0" lvl="8" algn="l" rtl="0">
-              <a:lnSpc>
-                <a:spcPct val="100000"/>
-              </a:lnSpc>
-              <a:spcBef>
-                <a:spcPts val="0"/>
-              </a:spcBef>
-              <a:spcAft>
-                <a:spcPts val="0"/>
-              </a:spcAft>
-              <a:buClr>
-                <a:srgbClr val="000000"/>
-              </a:buClr>
-              <a:buSzPts val="1400"/>
-              <a:buFont typeface="Arial"/>
-              <a:buNone/>
-              <a:defRPr sz="1800" b="0" i="0" u="none" strike="noStrike" cap="none">
-                <a:solidFill>
-                  <a:schemeClr val="dk1"/>
-                </a:solidFill>
-                <a:latin typeface="Arial"/>
-                <a:ea typeface="Arial"/>
-                <a:cs typeface="Arial"/>
-                <a:sym typeface="Arial"/>
-              </a:defRPr>
-            </a:lvl9pPr>
-          </a:lstStyle>
-          <a:p>
-            <a:pPr algn="ctr"/>
-            <a:endParaRPr/>
-          </a:p>
-        </p:txBody>
-      </p:sp>
-      <p:sp>
-        <p:nvSpPr>
-          <p:cNvPr id="321" name="Google Shape;321;p31"/>
-          <p:cNvSpPr txBox="1">
-            <a:spLocks noGrp="1"/>
-          </p:cNvSpPr>
-          <p:nvPr>
-            <p:ph type="sldNum" idx="12"/>
-          </p:nvPr>
-        </p:nvSpPr>
-        <p:spPr>
-          <a:xfrm>
-            <a:off x="10134600" y="6553200"/>
-            <a:ext cx="533400" cy="304800"/>
-          </a:xfrm>
-          <a:prstGeom prst="rect">
-            <a:avLst/>
-          </a:prstGeom>
-          <a:noFill/>
-          <a:ln>
-            <a:noFill/>
-          </a:ln>
-        </p:spPr>
-        <p:txBody>
-          <a:bodyPr spcFirstLastPara="1" wrap="square" lIns="92075" tIns="46025" rIns="92075" bIns="46025" anchor="ctr" anchorCtr="0">
-            <a:noAutofit/>
-          </a:bodyPr>
-          <a:lstStyle/>
-          <a:p>
-            <a:pPr algn="r"/>
-            <a:fld id="{00000000-1234-1234-1234-123412341234}" type="slidenum">
-              <a:rPr lang="en-US" sz="1400" b="1">
-                <a:solidFill>
-                  <a:srgbClr val="FF9900"/>
-                </a:solidFill>
-                <a:latin typeface="Times New Roman"/>
-                <a:ea typeface="Times New Roman"/>
-                <a:cs typeface="Times New Roman"/>
-                <a:sym typeface="Times New Roman"/>
-              </a:rPr>
-              <a:pPr algn="r"/>
-              <a:t>23</a:t>
-            </a:fld>
-            <a:endParaRPr sz="1400">
-              <a:solidFill>
-                <a:srgbClr val="FF9900"/>
-              </a:solidFill>
-              <a:latin typeface="Times New Roman"/>
-              <a:ea typeface="Times New Roman"/>
-              <a:cs typeface="Times New Roman"/>
-              <a:sym typeface="Times New Roman"/>
-            </a:endParaRPr>
           </a:p>
         </p:txBody>
       </p:sp>

</xml_diff>